<commit_message>
minor cleanup to presentation
</commit_message>
<xml_diff>
--- a/Splunking-Infoblox-IPAM-DNS-RPZ-Feeds.pptx
+++ b/Splunking-Infoblox-IPAM-DNS-RPZ-Feeds.pptx
@@ -5,10 +5,10 @@
     <p:sldMasterId id="2147483660" r:id="rId4"/>
   </p:sldMasterIdLst>
   <p:notesMasterIdLst>
-    <p:notesMasterId r:id="rId42"/>
+    <p:notesMasterId r:id="rId41"/>
   </p:notesMasterIdLst>
   <p:handoutMasterIdLst>
-    <p:handoutMasterId r:id="rId43"/>
+    <p:handoutMasterId r:id="rId42"/>
   </p:handoutMasterIdLst>
   <p:sldIdLst>
     <p:sldId id="257" r:id="rId5"/>
@@ -45,9 +45,8 @@
     <p:sldId id="296" r:id="rId36"/>
     <p:sldId id="295" r:id="rId37"/>
     <p:sldId id="290" r:id="rId38"/>
-    <p:sldId id="297" r:id="rId39"/>
-    <p:sldId id="298" r:id="rId40"/>
-    <p:sldId id="299" r:id="rId41"/>
+    <p:sldId id="298" r:id="rId39"/>
+    <p:sldId id="299" r:id="rId40"/>
   </p:sldIdLst>
   <p:sldSz cx="12188825" cy="6858000"/>
   <p:notesSz cx="7010400" cy="9296400"/>
@@ -277,7 +276,7 @@
           <a:p>
             <a:fld id="{FE5B4EDC-59C0-49C7-8ADA-5A781B329E02}" type="datetimeFigureOut">
               <a:rPr lang="en-US"/>
-              <a:t>1/30/2018</a:t>
+              <a:t>2/16/2018</a:t>
             </a:fld>
             <a:endParaRPr/>
           </a:p>
@@ -442,7 +441,7 @@
           <a:p>
             <a:fld id="{F2D8D46A-B586-417D-BFBD-8C8FE0AAF762}" type="datetimeFigureOut">
               <a:rPr lang="en-US"/>
-              <a:t>1/30/2018</a:t>
+              <a:t>2/16/2018</a:t>
             </a:fld>
             <a:endParaRPr/>
           </a:p>
@@ -3169,7 +3168,7 @@
     </p:spTree>
     <p:extLst>
       <p:ext uri="{BB962C8B-B14F-4D97-AF65-F5344CB8AC3E}">
-        <p14:creationId xmlns:p14="http://schemas.microsoft.com/office/powerpoint/2010/main" val="3842143225"/>
+        <p14:creationId xmlns:p14="http://schemas.microsoft.com/office/powerpoint/2010/main" val="4012557095"/>
       </p:ext>
     </p:extLst>
   </p:cSld>
@@ -3245,90 +3244,6 @@
             <a:fld id="{3EBA5BD7-F043-4D1B-AA17-CD412FC534DE}" type="slidenum">
               <a:rPr lang="en-US" smtClean="0"/>
               <a:t>36</a:t>
-            </a:fld>
-            <a:endParaRPr lang="en-US"/>
-          </a:p>
-        </p:txBody>
-      </p:sp>
-    </p:spTree>
-    <p:extLst>
-      <p:ext uri="{BB962C8B-B14F-4D97-AF65-F5344CB8AC3E}">
-        <p14:creationId xmlns:p14="http://schemas.microsoft.com/office/powerpoint/2010/main" val="4012557095"/>
-      </p:ext>
-    </p:extLst>
-  </p:cSld>
-  <p:clrMapOvr>
-    <a:masterClrMapping/>
-  </p:clrMapOvr>
-</p:notes>
-</file>
-
-<file path=ppt/notesSlides/notesSlide37.xml><?xml version="1.0" encoding="utf-8"?>
-<p:notes xmlns:a="http://schemas.openxmlformats.org/drawingml/2006/main" xmlns:r="http://schemas.openxmlformats.org/officeDocument/2006/relationships" xmlns:p="http://schemas.openxmlformats.org/presentationml/2006/main">
-  <p:cSld>
-    <p:spTree>
-      <p:nvGrpSpPr>
-        <p:cNvPr id="1" name=""/>
-        <p:cNvGrpSpPr/>
-        <p:nvPr/>
-      </p:nvGrpSpPr>
-      <p:grpSpPr>
-        <a:xfrm>
-          <a:off x="0" y="0"/>
-          <a:ext cx="0" cy="0"/>
-          <a:chOff x="0" y="0"/>
-          <a:chExt cx="0" cy="0"/>
-        </a:xfrm>
-      </p:grpSpPr>
-      <p:sp>
-        <p:nvSpPr>
-          <p:cNvPr id="2" name="Slide Image Placeholder 1"/>
-          <p:cNvSpPr>
-            <a:spLocks noGrp="1" noRot="1" noChangeAspect="1"/>
-          </p:cNvSpPr>
-          <p:nvPr>
-            <p:ph type="sldImg"/>
-          </p:nvPr>
-        </p:nvSpPr>
-        <p:spPr/>
-      </p:sp>
-      <p:sp>
-        <p:nvSpPr>
-          <p:cNvPr id="3" name="Notes Placeholder 2"/>
-          <p:cNvSpPr>
-            <a:spLocks noGrp="1"/>
-          </p:cNvSpPr>
-          <p:nvPr>
-            <p:ph type="body" idx="1"/>
-          </p:nvPr>
-        </p:nvSpPr>
-        <p:spPr/>
-        <p:txBody>
-          <a:bodyPr/>
-          <a:lstStyle/>
-          <a:p>
-            <a:endParaRPr lang="en-US"/>
-          </a:p>
-        </p:txBody>
-      </p:sp>
-      <p:sp>
-        <p:nvSpPr>
-          <p:cNvPr id="4" name="Slide Number Placeholder 3"/>
-          <p:cNvSpPr>
-            <a:spLocks noGrp="1"/>
-          </p:cNvSpPr>
-          <p:nvPr>
-            <p:ph type="sldNum" sz="quarter" idx="10"/>
-          </p:nvPr>
-        </p:nvSpPr>
-        <p:spPr/>
-        <p:txBody>
-          <a:bodyPr/>
-          <a:lstStyle/>
-          <a:p>
-            <a:fld id="{3EBA5BD7-F043-4D1B-AA17-CD412FC534DE}" type="slidenum">
-              <a:rPr lang="en-US" smtClean="0"/>
-              <a:t>37</a:t>
             </a:fld>
             <a:endParaRPr lang="en-US"/>
           </a:p>
@@ -8460,6 +8375,16 @@
               <a:t> and python</a:t>
             </a:r>
           </a:p>
+          <a:p>
+            <a:r>
+              <a:rPr lang="en-US" dirty="0" err="1"/>
+              <a:t>Infoblox</a:t>
+            </a:r>
+            <a:r>
+              <a:rPr lang="en-US" dirty="0"/>
+              <a:t> community expert series</a:t>
+            </a:r>
+          </a:p>
         </p:txBody>
       </p:sp>
       <p:sp>
@@ -10727,6 +10652,50 @@
           </a:p>
         </p:txBody>
       </p:sp>
+      <p:sp>
+        <p:nvSpPr>
+          <p:cNvPr id="7" name="Arrow: Right 6">
+            <a:extLst>
+              <a:ext uri="{FF2B5EF4-FFF2-40B4-BE49-F238E27FC236}">
+                <a16:creationId xmlns:a16="http://schemas.microsoft.com/office/drawing/2014/main" id="{7648368C-CC3B-47CA-B63B-662A3B20E2F2}"/>
+              </a:ext>
+            </a:extLst>
+          </p:cNvPr>
+          <p:cNvSpPr/>
+          <p:nvPr/>
+        </p:nvSpPr>
+        <p:spPr>
+          <a:xfrm>
+            <a:off x="2691500" y="1708064"/>
+            <a:ext cx="762000" cy="304800"/>
+          </a:xfrm>
+          <a:prstGeom prst="rightArrow">
+            <a:avLst/>
+          </a:prstGeom>
+        </p:spPr>
+        <p:style>
+          <a:lnRef idx="1">
+            <a:schemeClr val="accent4"/>
+          </a:lnRef>
+          <a:fillRef idx="2">
+            <a:schemeClr val="accent4"/>
+          </a:fillRef>
+          <a:effectRef idx="1">
+            <a:schemeClr val="accent4"/>
+          </a:effectRef>
+          <a:fontRef idx="minor">
+            <a:schemeClr val="dk1"/>
+          </a:fontRef>
+        </p:style>
+        <p:txBody>
+          <a:bodyPr rtlCol="0" anchor="ctr"/>
+          <a:lstStyle/>
+          <a:p>
+            <a:pPr algn="ctr"/>
+            <a:endParaRPr lang="en-US" sz="2800"/>
+          </a:p>
+        </p:txBody>
+      </p:sp>
     </p:spTree>
     <p:extLst>
       <p:ext uri="{BB962C8B-B14F-4D97-AF65-F5344CB8AC3E}">
@@ -10851,6 +10820,19 @@
                 <a:hlinkClick r:id="rId4"/>
               </a:rPr>
               <a:t>https://Infoblox.local/wapidoc</a:t>
+            </a:r>
+            <a:br>
+              <a:rPr lang="en-US" dirty="0"/>
+            </a:br>
+            <a:r>
+              <a:rPr lang="en-US" dirty="0">
+                <a:hlinkClick r:id="rId5"/>
+              </a:rPr>
+              <a:t>https://infoblox.local/wapi/v2.0/network?_schema</a:t>
+            </a:r>
+            <a:r>
+              <a:rPr lang="en-US" dirty="0"/>
+              <a:t> for all options on network object</a:t>
             </a:r>
             <a:br>
               <a:rPr lang="en-US" dirty="0"/>
@@ -11542,8 +11524,11 @@
               <a:rPr lang="en-US" dirty="0">
                 <a:hlinkClick r:id="rId3"/>
               </a:rPr>
-              <a:t>https://gist.github.com/pmeyerson/7e4eb308392eb6b273dd1b61abaf45da</a:t>
-            </a:r>
+              <a:t>https://github.com/pmeyerson/splunk-infoblox-wapi</a:t>
+            </a:r>
+            <a:endParaRPr lang="en-US" dirty="0"/>
+          </a:p>
+          <a:p>
             <a:endParaRPr lang="en-US" dirty="0"/>
           </a:p>
           <a:p>
@@ -11680,7 +11665,7 @@
         </p:nvSpPr>
         <p:spPr>
           <a:xfrm>
-            <a:off x="2132012" y="3932933"/>
+            <a:off x="1979612" y="3886200"/>
             <a:ext cx="5459837" cy="1815882"/>
           </a:xfrm>
           <a:prstGeom prst="rect">
@@ -15753,7 +15738,7 @@
           <a:p>
             <a:r>
               <a:rPr lang="en-US" dirty="0"/>
-              <a:t>RPZ Feed - </a:t>
+              <a:t>RPZ Threat Feed Subscriptions- </a:t>
             </a:r>
           </a:p>
         </p:txBody>
@@ -16871,7 +16856,7 @@
           <p:cNvPr id="2" name="Title 1">
             <a:extLst>
               <a:ext uri="{FF2B5EF4-FFF2-40B4-BE49-F238E27FC236}">
-                <a16:creationId xmlns:a16="http://schemas.microsoft.com/office/drawing/2014/main" id="{C7C4C73E-5712-4565-A484-EE6438C6F11F}"/>
+                <a16:creationId xmlns:a16="http://schemas.microsoft.com/office/drawing/2014/main" id="{45F1E18C-DC0E-4613-B662-CF9EC47E2C4F}"/>
               </a:ext>
             </a:extLst>
           </p:cNvPr>
@@ -16889,7 +16874,7 @@
           <a:p>
             <a:r>
               <a:rPr lang="en-US" dirty="0"/>
-              <a:t>Thank you!</a:t>
+              <a:t>References</a:t>
             </a:r>
           </a:p>
         </p:txBody>
@@ -16899,7 +16884,7 @@
           <p:cNvPr id="3" name="Content Placeholder 2">
             <a:extLst>
               <a:ext uri="{FF2B5EF4-FFF2-40B4-BE49-F238E27FC236}">
-                <a16:creationId xmlns:a16="http://schemas.microsoft.com/office/drawing/2014/main" id="{2A6ECD54-420B-4CB7-AECE-73DBFD546148}"/>
+                <a16:creationId xmlns:a16="http://schemas.microsoft.com/office/drawing/2014/main" id="{BC7453FC-81D1-4401-BA57-774A51702305}"/>
               </a:ext>
             </a:extLst>
           </p:cNvPr>
@@ -16912,60 +16897,183 @@
         </p:nvSpPr>
         <p:spPr/>
         <p:txBody>
-          <a:bodyPr/>
-          <a:lstStyle/>
-          <a:p>
-            <a:r>
-              <a:rPr lang="en-US" dirty="0"/>
-              <a:t>Questions? Comments?</a:t>
-            </a:r>
-          </a:p>
-          <a:p>
-            <a:r>
-              <a:rPr lang="en-US" dirty="0"/>
-              <a:t>It takes a village – share what you can</a:t>
-            </a:r>
-          </a:p>
-          <a:p>
-            <a:r>
-              <a:rPr lang="en-US" dirty="0"/>
-              <a:t>Infoblox community, </a:t>
-            </a:r>
-            <a:r>
-              <a:rPr lang="en-US" dirty="0" err="1"/>
-              <a:t>github</a:t>
-            </a:r>
-            <a:r>
-              <a:rPr lang="en-US" dirty="0"/>
-              <a:t>, answers.splunk.com, splunk slack channel … RFC1149 – IP over AC submissions also accepted ;)</a:t>
-            </a:r>
-          </a:p>
-          <a:p>
-            <a:r>
-              <a:rPr lang="en-US" dirty="0"/>
-              <a:t>Next Up: “Detecting Dictionary DGA Using Machine Learning” </a:t>
+          <a:bodyPr>
+            <a:normAutofit fontScale="92500" lnSpcReduction="10000"/>
+          </a:bodyPr>
+          <a:lstStyle/>
+          <a:p>
+            <a:r>
+              <a:rPr lang="en-US" sz="1800" dirty="0"/>
+              <a:t>Contact:</a:t>
+            </a:r>
+          </a:p>
+          <a:p>
+            <a:pPr lvl="1"/>
+            <a:r>
+              <a:rPr lang="en-US" sz="1600" dirty="0"/>
+              <a:t>Splunk slack channel @</a:t>
+            </a:r>
+            <a:r>
+              <a:rPr lang="en-US" sz="1600" dirty="0" err="1"/>
+              <a:t>pmeyerson</a:t>
+            </a:r>
+            <a:endParaRPr lang="en-US" sz="1600" dirty="0"/>
+          </a:p>
+          <a:p>
+            <a:pPr lvl="1"/>
+            <a:r>
+              <a:rPr lang="en-US" sz="1600" dirty="0">
+                <a:hlinkClick r:id="rId3"/>
+              </a:rPr>
+              <a:t>https://community.infoblox.com/t5/user/viewprofilepage/user-id/25546</a:t>
+            </a:r>
+            <a:r>
+              <a:rPr lang="en-US" sz="1600" dirty="0"/>
+              <a:t> (Phillip Meyerson @ community.Infoblox.com)</a:t>
+            </a:r>
+            <a:endParaRPr lang="en-US" sz="1600" dirty="0">
+              <a:hlinkClick r:id="rId4"/>
+            </a:endParaRPr>
+          </a:p>
+          <a:p>
+            <a:pPr lvl="1"/>
+            <a:r>
+              <a:rPr lang="en-US" sz="1600" dirty="0">
+                <a:hlinkClick r:id="rId4"/>
+              </a:rPr>
+              <a:t>https://www.linkedin.com/in/philmeyerson</a:t>
+            </a:r>
+            <a:endParaRPr lang="en-US" sz="1600" dirty="0"/>
+          </a:p>
+          <a:p>
+            <a:pPr lvl="1"/>
+            <a:r>
+              <a:rPr lang="en-US" sz="1600" dirty="0">
+                <a:hlinkClick r:id="rId5"/>
+              </a:rPr>
+              <a:t>https://Gist.github.com/pmeyerson</a:t>
+            </a:r>
+            <a:endParaRPr lang="en-US" sz="1600" dirty="0"/>
+          </a:p>
+          <a:p>
+            <a:pPr lvl="1"/>
+            <a:r>
+              <a:rPr lang="en-US" sz="1600" dirty="0">
+                <a:hlinkClick r:id="rId6"/>
+              </a:rPr>
+              <a:t>https://docs.google.com/forms/d/e/1FAIpQLScQ6gM0v8bmUq6vbPd77fdWv8BCmd77UaPaDSh-7YhcXbVXXQ/viewform</a:t>
+            </a:r>
+            <a:r>
+              <a:rPr lang="en-US" sz="1600" dirty="0"/>
+              <a:t> (Splunk slack channel sign up)</a:t>
+            </a:r>
+            <a:endParaRPr lang="en-US" sz="1200" dirty="0"/>
+          </a:p>
+          <a:p>
+            <a:r>
+              <a:rPr lang="en-US" sz="1800" dirty="0"/>
+              <a:t>Splunk Add-Ons</a:t>
+            </a:r>
+          </a:p>
+          <a:p>
+            <a:pPr lvl="1"/>
+            <a:r>
+              <a:rPr lang="en-US" sz="1600" dirty="0">
+                <a:hlinkClick r:id="rId7"/>
+              </a:rPr>
+              <a:t>Infoblox (syslog export method) - https://splunkbase.splunk.com/app/2934</a:t>
+            </a:r>
+            <a:r>
+              <a:rPr lang="en-US" sz="1600" dirty="0"/>
+              <a:t> </a:t>
+            </a:r>
+          </a:p>
+          <a:p>
+            <a:pPr lvl="1"/>
+            <a:r>
+              <a:rPr lang="en-US" sz="1600" dirty="0">
+                <a:hlinkClick r:id="rId8"/>
+              </a:rPr>
+              <a:t>REST API Modular Input - http://splunkbase.com/app/1546</a:t>
+            </a:r>
+            <a:endParaRPr lang="en-US" sz="1600" dirty="0"/>
+          </a:p>
+          <a:p>
+            <a:pPr lvl="1"/>
+            <a:r>
+              <a:rPr lang="en-US" sz="1600" dirty="0">
+                <a:hlinkClick r:id="rId9"/>
+              </a:rPr>
+              <a:t>https://splunkbase.splunk.com/app/3330/</a:t>
+            </a:r>
+            <a:r>
+              <a:rPr lang="en-US" sz="1600" dirty="0"/>
+              <a:t> (.</a:t>
+            </a:r>
+            <a:r>
+              <a:rPr lang="en-US" sz="1600" dirty="0" err="1"/>
+              <a:t>conf</a:t>
+            </a:r>
+            <a:r>
+              <a:rPr lang="en-US" sz="1600" dirty="0"/>
+              <a:t> archive search of presentations!)</a:t>
+            </a:r>
+          </a:p>
+          <a:p>
+            <a:r>
+              <a:rPr lang="en-US" sz="1800" dirty="0"/>
+              <a:t>DNS Threat Hunting – Ryan Kovar &amp; Steve Brant</a:t>
+            </a:r>
+          </a:p>
+          <a:p>
+            <a:pPr lvl="1"/>
+            <a:r>
+              <a:rPr lang="en-US" sz="1800" dirty="0">
+                <a:hlinkClick r:id="rId10"/>
+              </a:rPr>
+              <a:t>https://github.com/rkovar/dns_detection/blob/master/known_unknown_DNS.pdf</a:t>
+            </a:r>
+            <a:endParaRPr lang="en-US" sz="1800" dirty="0"/>
+          </a:p>
+          <a:p>
+            <a:pPr lvl="1"/>
+            <a:r>
+              <a:rPr lang="en-US" sz="1800" dirty="0">
+                <a:hlinkClick r:id="rId11"/>
+              </a:rPr>
+              <a:t>http://conf.splunk.com/session/2015/recordings/2015-splunk-136.mp4</a:t>
             </a:r>
             <a:br>
-              <a:rPr lang="en-US" dirty="0"/>
+              <a:rPr lang="en-US" sz="1800" dirty="0"/>
             </a:br>
-            <a:r>
-              <a:rPr lang="en-US" dirty="0"/>
-              <a:t> - </a:t>
-            </a:r>
-            <a:r>
-              <a:rPr lang="en-US" dirty="0" err="1"/>
-              <a:t>Mayana</a:t>
-            </a:r>
-            <a:r>
-              <a:rPr lang="en-US" dirty="0"/>
-              <a:t> Pereira Data, Scientist, Infoblox Feb 6 10a PST</a:t>
-            </a:r>
-            <a:br>
-              <a:rPr lang="en-US" dirty="0"/>
-            </a:br>
+            <a:endParaRPr lang="en-US" sz="1800" dirty="0"/>
+          </a:p>
+          <a:p>
+            <a:pPr lvl="1"/>
+            <a:endParaRPr lang="en-US" sz="1800" dirty="0"/>
+          </a:p>
+          <a:p>
+            <a:pPr lvl="1"/>
             <a:endParaRPr lang="en-US" dirty="0"/>
           </a:p>
           <a:p>
+            <a:pPr lvl="1"/>
+            <a:endParaRPr lang="en-US" dirty="0"/>
+          </a:p>
+          <a:p>
+            <a:pPr lvl="1"/>
+            <a:endParaRPr lang="en-US" dirty="0"/>
+          </a:p>
+          <a:p>
+            <a:pPr lvl="1"/>
+            <a:endParaRPr lang="en-US" dirty="0"/>
+          </a:p>
+          <a:p>
+            <a:pPr lvl="1"/>
+            <a:endParaRPr lang="en-US" dirty="0"/>
+          </a:p>
+          <a:p>
+            <a:pPr lvl="1"/>
             <a:endParaRPr lang="en-US" dirty="0"/>
           </a:p>
         </p:txBody>
@@ -16975,7 +17083,7 @@
           <p:cNvPr id="4" name="Date Placeholder 3">
             <a:extLst>
               <a:ext uri="{FF2B5EF4-FFF2-40B4-BE49-F238E27FC236}">
-                <a16:creationId xmlns:a16="http://schemas.microsoft.com/office/drawing/2014/main" id="{25A84656-4C5C-4F70-8FA0-DB36D946C3E0}"/>
+                <a16:creationId xmlns:a16="http://schemas.microsoft.com/office/drawing/2014/main" id="{7370E1E1-ED3C-4BDA-B127-F108AFB78E86}"/>
               </a:ext>
             </a:extLst>
           </p:cNvPr>
@@ -17003,7 +17111,7 @@
           <p:cNvPr id="5" name="Footer Placeholder 4">
             <a:extLst>
               <a:ext uri="{FF2B5EF4-FFF2-40B4-BE49-F238E27FC236}">
-                <a16:creationId xmlns:a16="http://schemas.microsoft.com/office/drawing/2014/main" id="{3D59D39C-B36E-4314-9302-F5AF071C342C}"/>
+                <a16:creationId xmlns:a16="http://schemas.microsoft.com/office/drawing/2014/main" id="{2CE313CF-ECCB-445A-A018-AF186D4542A2}"/>
               </a:ext>
             </a:extLst>
           </p:cNvPr>
@@ -17031,7 +17139,7 @@
           <p:cNvPr id="6" name="Slide Number Placeholder 5">
             <a:extLst>
               <a:ext uri="{FF2B5EF4-FFF2-40B4-BE49-F238E27FC236}">
-                <a16:creationId xmlns:a16="http://schemas.microsoft.com/office/drawing/2014/main" id="{2B48D0C1-E1BE-46A2-B15B-0ADFC0FD0437}"/>
+                <a16:creationId xmlns:a16="http://schemas.microsoft.com/office/drawing/2014/main" id="{A62FA92D-96A9-4897-A06C-6D9C678803B7}"/>
               </a:ext>
             </a:extLst>
           </p:cNvPr>
@@ -17058,7 +17166,7 @@
     </p:spTree>
     <p:extLst>
       <p:ext uri="{BB962C8B-B14F-4D97-AF65-F5344CB8AC3E}">
-        <p14:creationId xmlns:p14="http://schemas.microsoft.com/office/powerpoint/2010/main" val="2231984091"/>
+        <p14:creationId xmlns:p14="http://schemas.microsoft.com/office/powerpoint/2010/main" val="3781765235"/>
       </p:ext>
     </p:extLst>
   </p:cSld>
@@ -17102,360 +17210,6 @@
           <p:cNvPr id="2" name="Title 1">
             <a:extLst>
               <a:ext uri="{FF2B5EF4-FFF2-40B4-BE49-F238E27FC236}">
-                <a16:creationId xmlns:a16="http://schemas.microsoft.com/office/drawing/2014/main" id="{45F1E18C-DC0E-4613-B662-CF9EC47E2C4F}"/>
-              </a:ext>
-            </a:extLst>
-          </p:cNvPr>
-          <p:cNvSpPr>
-            <a:spLocks noGrp="1"/>
-          </p:cNvSpPr>
-          <p:nvPr>
-            <p:ph type="title"/>
-          </p:nvPr>
-        </p:nvSpPr>
-        <p:spPr/>
-        <p:txBody>
-          <a:bodyPr/>
-          <a:lstStyle/>
-          <a:p>
-            <a:r>
-              <a:rPr lang="en-US" dirty="0"/>
-              <a:t>References</a:t>
-            </a:r>
-          </a:p>
-        </p:txBody>
-      </p:sp>
-      <p:sp>
-        <p:nvSpPr>
-          <p:cNvPr id="3" name="Content Placeholder 2">
-            <a:extLst>
-              <a:ext uri="{FF2B5EF4-FFF2-40B4-BE49-F238E27FC236}">
-                <a16:creationId xmlns:a16="http://schemas.microsoft.com/office/drawing/2014/main" id="{BC7453FC-81D1-4401-BA57-774A51702305}"/>
-              </a:ext>
-            </a:extLst>
-          </p:cNvPr>
-          <p:cNvSpPr>
-            <a:spLocks noGrp="1"/>
-          </p:cNvSpPr>
-          <p:nvPr>
-            <p:ph idx="1"/>
-          </p:nvPr>
-        </p:nvSpPr>
-        <p:spPr/>
-        <p:txBody>
-          <a:bodyPr>
-            <a:normAutofit fontScale="92500" lnSpcReduction="10000"/>
-          </a:bodyPr>
-          <a:lstStyle/>
-          <a:p>
-            <a:r>
-              <a:rPr lang="en-US" sz="1800" dirty="0"/>
-              <a:t>Contact:</a:t>
-            </a:r>
-          </a:p>
-          <a:p>
-            <a:pPr lvl="1"/>
-            <a:r>
-              <a:rPr lang="en-US" sz="1600" dirty="0"/>
-              <a:t>Splunk slack channel @</a:t>
-            </a:r>
-            <a:r>
-              <a:rPr lang="en-US" sz="1600" dirty="0" err="1"/>
-              <a:t>pmeyerson</a:t>
-            </a:r>
-            <a:endParaRPr lang="en-US" sz="1600" dirty="0"/>
-          </a:p>
-          <a:p>
-            <a:pPr lvl="1"/>
-            <a:r>
-              <a:rPr lang="en-US" sz="1600" dirty="0">
-                <a:hlinkClick r:id="rId3"/>
-              </a:rPr>
-              <a:t>https://community.infoblox.com/t5/user/viewprofilepage/user-id/25546</a:t>
-            </a:r>
-            <a:r>
-              <a:rPr lang="en-US" sz="1600" dirty="0"/>
-              <a:t> (Phillip Meyerson @ community.Infoblox.com)</a:t>
-            </a:r>
-            <a:endParaRPr lang="en-US" sz="1600" dirty="0">
-              <a:hlinkClick r:id="rId4"/>
-            </a:endParaRPr>
-          </a:p>
-          <a:p>
-            <a:pPr lvl="1"/>
-            <a:r>
-              <a:rPr lang="en-US" sz="1600" dirty="0">
-                <a:hlinkClick r:id="rId4"/>
-              </a:rPr>
-              <a:t>https://www.linkedin.com/in/philmeyerson</a:t>
-            </a:r>
-            <a:endParaRPr lang="en-US" sz="1600" dirty="0"/>
-          </a:p>
-          <a:p>
-            <a:pPr lvl="1"/>
-            <a:r>
-              <a:rPr lang="en-US" sz="1600" dirty="0">
-                <a:hlinkClick r:id="rId5"/>
-              </a:rPr>
-              <a:t>https://Gist.github.com/pmeyerson</a:t>
-            </a:r>
-            <a:endParaRPr lang="en-US" sz="1600" dirty="0"/>
-          </a:p>
-          <a:p>
-            <a:pPr lvl="1"/>
-            <a:r>
-              <a:rPr lang="en-US" sz="1600" dirty="0">
-                <a:hlinkClick r:id="rId6"/>
-              </a:rPr>
-              <a:t>https://docs.google.com/forms/d/e/1FAIpQLScQ6gM0v8bmUq6vbPd77fdWv8BCmd77UaPaDSh-7YhcXbVXXQ/viewform</a:t>
-            </a:r>
-            <a:r>
-              <a:rPr lang="en-US" sz="1600" dirty="0"/>
-              <a:t> (Splunk slack channel sign up)</a:t>
-            </a:r>
-            <a:endParaRPr lang="en-US" sz="1200" dirty="0"/>
-          </a:p>
-          <a:p>
-            <a:r>
-              <a:rPr lang="en-US" sz="1800" dirty="0"/>
-              <a:t>Splunk Add-Ons</a:t>
-            </a:r>
-          </a:p>
-          <a:p>
-            <a:pPr lvl="1"/>
-            <a:r>
-              <a:rPr lang="en-US" sz="1600" dirty="0">
-                <a:hlinkClick r:id="rId7"/>
-              </a:rPr>
-              <a:t>Infoblox (syslog export method) - https://splunkbase.splunk.com/app/2934</a:t>
-            </a:r>
-            <a:r>
-              <a:rPr lang="en-US" sz="1600" dirty="0"/>
-              <a:t> </a:t>
-            </a:r>
-          </a:p>
-          <a:p>
-            <a:pPr lvl="1"/>
-            <a:r>
-              <a:rPr lang="en-US" sz="1600" dirty="0">
-                <a:hlinkClick r:id="rId8"/>
-              </a:rPr>
-              <a:t>REST API Modular Input - http://splunkbase.com/app/1546</a:t>
-            </a:r>
-            <a:endParaRPr lang="en-US" sz="1600" dirty="0"/>
-          </a:p>
-          <a:p>
-            <a:pPr lvl="1"/>
-            <a:r>
-              <a:rPr lang="en-US" sz="1600" dirty="0">
-                <a:hlinkClick r:id="rId9"/>
-              </a:rPr>
-              <a:t>https://splunkbase.splunk.com/app/3330/</a:t>
-            </a:r>
-            <a:r>
-              <a:rPr lang="en-US" sz="1600" dirty="0"/>
-              <a:t> (.</a:t>
-            </a:r>
-            <a:r>
-              <a:rPr lang="en-US" sz="1600" dirty="0" err="1"/>
-              <a:t>conf</a:t>
-            </a:r>
-            <a:r>
-              <a:rPr lang="en-US" sz="1600" dirty="0"/>
-              <a:t> archive search of presentations!)</a:t>
-            </a:r>
-          </a:p>
-          <a:p>
-            <a:r>
-              <a:rPr lang="en-US" sz="1800" dirty="0"/>
-              <a:t>DNS Threat Hunting – Ryan Kovar &amp; Steve Brant</a:t>
-            </a:r>
-          </a:p>
-          <a:p>
-            <a:pPr lvl="1"/>
-            <a:r>
-              <a:rPr lang="en-US" sz="1800" dirty="0">
-                <a:hlinkClick r:id="rId10"/>
-              </a:rPr>
-              <a:t>https://github.com/rkovar/dns_detection/blob/master/known_unknown_DNS.pdf</a:t>
-            </a:r>
-            <a:endParaRPr lang="en-US" sz="1800" dirty="0"/>
-          </a:p>
-          <a:p>
-            <a:pPr lvl="1"/>
-            <a:r>
-              <a:rPr lang="en-US" sz="1800" dirty="0">
-                <a:hlinkClick r:id="rId11"/>
-              </a:rPr>
-              <a:t>http://conf.splunk.com/session/2015/recordings/2015-splunk-136.mp4</a:t>
-            </a:r>
-            <a:br>
-              <a:rPr lang="en-US" sz="1800" dirty="0"/>
-            </a:br>
-            <a:endParaRPr lang="en-US" sz="1800" dirty="0"/>
-          </a:p>
-          <a:p>
-            <a:pPr lvl="1"/>
-            <a:endParaRPr lang="en-US" sz="1800" dirty="0"/>
-          </a:p>
-          <a:p>
-            <a:pPr lvl="1"/>
-            <a:endParaRPr lang="en-US" dirty="0"/>
-          </a:p>
-          <a:p>
-            <a:pPr lvl="1"/>
-            <a:endParaRPr lang="en-US" dirty="0"/>
-          </a:p>
-          <a:p>
-            <a:pPr lvl="1"/>
-            <a:endParaRPr lang="en-US" dirty="0"/>
-          </a:p>
-          <a:p>
-            <a:pPr lvl="1"/>
-            <a:endParaRPr lang="en-US" dirty="0"/>
-          </a:p>
-          <a:p>
-            <a:pPr lvl="1"/>
-            <a:endParaRPr lang="en-US" dirty="0"/>
-          </a:p>
-          <a:p>
-            <a:pPr lvl="1"/>
-            <a:endParaRPr lang="en-US" dirty="0"/>
-          </a:p>
-        </p:txBody>
-      </p:sp>
-      <p:sp>
-        <p:nvSpPr>
-          <p:cNvPr id="4" name="Date Placeholder 3">
-            <a:extLst>
-              <a:ext uri="{FF2B5EF4-FFF2-40B4-BE49-F238E27FC236}">
-                <a16:creationId xmlns:a16="http://schemas.microsoft.com/office/drawing/2014/main" id="{7370E1E1-ED3C-4BDA-B127-F108AFB78E86}"/>
-              </a:ext>
-            </a:extLst>
-          </p:cNvPr>
-          <p:cNvSpPr>
-            <a:spLocks noGrp="1"/>
-          </p:cNvSpPr>
-          <p:nvPr>
-            <p:ph type="dt" sz="half" idx="10"/>
-          </p:nvPr>
-        </p:nvSpPr>
-        <p:spPr/>
-        <p:txBody>
-          <a:bodyPr/>
-          <a:lstStyle/>
-          <a:p>
-            <a:r>
-              <a:rPr lang="en-US"/>
-              <a:t>1/30/2018</a:t>
-            </a:r>
-          </a:p>
-        </p:txBody>
-      </p:sp>
-      <p:sp>
-        <p:nvSpPr>
-          <p:cNvPr id="5" name="Footer Placeholder 4">
-            <a:extLst>
-              <a:ext uri="{FF2B5EF4-FFF2-40B4-BE49-F238E27FC236}">
-                <a16:creationId xmlns:a16="http://schemas.microsoft.com/office/drawing/2014/main" id="{2CE313CF-ECCB-445A-A018-AF186D4542A2}"/>
-              </a:ext>
-            </a:extLst>
-          </p:cNvPr>
-          <p:cNvSpPr>
-            <a:spLocks noGrp="1"/>
-          </p:cNvSpPr>
-          <p:nvPr>
-            <p:ph type="ftr" sz="quarter" idx="11"/>
-          </p:nvPr>
-        </p:nvSpPr>
-        <p:spPr/>
-        <p:txBody>
-          <a:bodyPr/>
-          <a:lstStyle/>
-          <a:p>
-            <a:r>
-              <a:rPr lang="en-US" dirty="0"/>
-              <a:t>Splunking Infoblox</a:t>
-            </a:r>
-          </a:p>
-        </p:txBody>
-      </p:sp>
-      <p:sp>
-        <p:nvSpPr>
-          <p:cNvPr id="6" name="Slide Number Placeholder 5">
-            <a:extLst>
-              <a:ext uri="{FF2B5EF4-FFF2-40B4-BE49-F238E27FC236}">
-                <a16:creationId xmlns:a16="http://schemas.microsoft.com/office/drawing/2014/main" id="{A62FA92D-96A9-4897-A06C-6D9C678803B7}"/>
-              </a:ext>
-            </a:extLst>
-          </p:cNvPr>
-          <p:cNvSpPr>
-            <a:spLocks noGrp="1"/>
-          </p:cNvSpPr>
-          <p:nvPr>
-            <p:ph type="sldNum" sz="quarter" idx="12"/>
-          </p:nvPr>
-        </p:nvSpPr>
-        <p:spPr/>
-        <p:txBody>
-          <a:bodyPr/>
-          <a:lstStyle/>
-          <a:p>
-            <a:fld id="{C014DD1E-5D91-48A3-AD6D-45FBA980D106}" type="slidenum">
-              <a:rPr lang="en-US" smtClean="0"/>
-              <a:t>36</a:t>
-            </a:fld>
-            <a:endParaRPr lang="en-US"/>
-          </a:p>
-        </p:txBody>
-      </p:sp>
-    </p:spTree>
-    <p:extLst>
-      <p:ext uri="{BB962C8B-B14F-4D97-AF65-F5344CB8AC3E}">
-        <p14:creationId xmlns:p14="http://schemas.microsoft.com/office/powerpoint/2010/main" val="3781765235"/>
-      </p:ext>
-    </p:extLst>
-  </p:cSld>
-  <p:clrMapOvr>
-    <a:masterClrMapping/>
-  </p:clrMapOvr>
-  <mc:AlternateContent xmlns:mc="http://schemas.openxmlformats.org/markup-compatibility/2006" xmlns:p14="http://schemas.microsoft.com/office/powerpoint/2010/main">
-    <mc:Choice Requires="p14">
-      <p:transition spd="med" p14:dur="700">
-        <p:fade/>
-      </p:transition>
-    </mc:Choice>
-    <mc:Fallback xmlns="">
-      <p:transition spd="med">
-        <p:fade/>
-      </p:transition>
-    </mc:Fallback>
-  </mc:AlternateContent>
-</p:sld>
-</file>
-
-<file path=ppt/slides/slide37.xml><?xml version="1.0" encoding="utf-8"?>
-<p:sld xmlns:a="http://schemas.openxmlformats.org/drawingml/2006/main" xmlns:r="http://schemas.openxmlformats.org/officeDocument/2006/relationships" xmlns:p="http://schemas.openxmlformats.org/presentationml/2006/main">
-  <p:cSld>
-    <p:spTree>
-      <p:nvGrpSpPr>
-        <p:cNvPr id="1" name=""/>
-        <p:cNvGrpSpPr/>
-        <p:nvPr/>
-      </p:nvGrpSpPr>
-      <p:grpSpPr>
-        <a:xfrm>
-          <a:off x="0" y="0"/>
-          <a:ext cx="0" cy="0"/>
-          <a:chOff x="0" y="0"/>
-          <a:chExt cx="0" cy="0"/>
-        </a:xfrm>
-      </p:grpSpPr>
-      <p:sp>
-        <p:nvSpPr>
-          <p:cNvPr id="2" name="Title 1">
-            <a:extLst>
-              <a:ext uri="{FF2B5EF4-FFF2-40B4-BE49-F238E27FC236}">
                 <a16:creationId xmlns:a16="http://schemas.microsoft.com/office/drawing/2014/main" id="{64782682-67E5-42B3-89F0-10A1DCE016C8}"/>
               </a:ext>
             </a:extLst>
@@ -17669,7 +17423,7 @@
           <a:p>
             <a:fld id="{C014DD1E-5D91-48A3-AD6D-45FBA980D106}" type="slidenum">
               <a:rPr lang="en-US" smtClean="0"/>
-              <a:t>37</a:t>
+              <a:t>36</a:t>
             </a:fld>
             <a:endParaRPr lang="en-US"/>
           </a:p>
@@ -18947,7 +18701,7 @@
         </p:spPr>
         <p:txBody>
           <a:bodyPr>
-            <a:normAutofit fontScale="92500"/>
+            <a:normAutofit fontScale="85000" lnSpcReduction="20000"/>
           </a:bodyPr>
           <a:lstStyle/>
           <a:p>
@@ -18972,6 +18726,12 @@
             <a:r>
               <a:rPr lang="en-US" dirty="0"/>
               <a:t>Cut noisy events from less relevant networks/sites in your searches</a:t>
+            </a:r>
+          </a:p>
+          <a:p>
+            <a:r>
+              <a:rPr lang="en-US" dirty="0"/>
+              <a:t>Can also use Extensible Attributes – requires slight change to API query</a:t>
             </a:r>
           </a:p>
           <a:p>
@@ -20119,6 +19879,15 @@
 </file>
 
 <file path=customXml/item1.xml><?xml version="1.0" encoding="utf-8"?>
+<?mso-contentType ?>
+<FormTemplates xmlns="http://schemas.microsoft.com/sharepoint/v3/contenttype/forms">
+  <Display>DocumentLibraryForm</Display>
+  <Edit>AssetEditForm</Edit>
+  <New>DocumentLibraryForm</New>
+</FormTemplates>
+</file>
+
+<file path=customXml/item2.xml><?xml version="1.0" encoding="utf-8"?>
 <p:properties xmlns:p="http://schemas.microsoft.com/office/2006/metadata/properties" xmlns:xsi="http://www.w3.org/2001/XMLSchema-instance" xmlns:pc="http://schemas.microsoft.com/office/infopath/2007/PartnerControls">
   <documentManagement>
     <LocPublishedLinkedAssetsLookup xmlns="4873beb7-5857-4685-be1f-d57550cc96cc" xsi:nil="true"/>
@@ -20254,7 +20023,7 @@
 </p:properties>
 </file>
 
-<file path=customXml/item2.xml><?xml version="1.0" encoding="utf-8"?>
+<file path=customXml/item3.xml><?xml version="1.0" encoding="utf-8"?>
 <ct:contentTypeSchema xmlns:ct="http://schemas.microsoft.com/office/2006/metadata/contentType" xmlns:ma="http://schemas.microsoft.com/office/2006/metadata/properties/metaAttributes" ct:_="" ma:_="" ma:contentTypeName="TemplateFile" ma:contentTypeID="0x0101006EDDDB5EE6D98C44930B742096920B300400F5B6D36B3EF94B4E9A635CDF2A18F5B8" ma:contentTypeVersion="72" ma:contentTypeDescription="Create a new document." ma:contentTypeScope="" ma:versionID="a23e56308344d904b51738559c3d67c9">
   <xsd:schema xmlns:xsd="http://www.w3.org/2001/XMLSchema" xmlns:xs="http://www.w3.org/2001/XMLSchema" xmlns:p="http://schemas.microsoft.com/office/2006/metadata/properties" xmlns:ns2="4873beb7-5857-4685-be1f-d57550cc96cc" targetNamespace="http://schemas.microsoft.com/office/2006/metadata/properties" ma:root="true" ma:fieldsID="cd0908cc4600e77bf5da051303e00c8d" ns2:_="">
     <xsd:import namespace="4873beb7-5857-4685-be1f-d57550cc96cc"/>
@@ -21294,16 +21063,15 @@
 </ct:contentTypeSchema>
 </file>
 
-<file path=customXml/item3.xml><?xml version="1.0" encoding="utf-8"?>
-<?mso-contentType ?>
-<FormTemplates xmlns="http://schemas.microsoft.com/sharepoint/v3/contenttype/forms">
-  <Display>DocumentLibraryForm</Display>
-  <Edit>AssetEditForm</Edit>
-  <New>DocumentLibraryForm</New>
-</FormTemplates>
+<file path=customXml/itemProps1.xml><?xml version="1.0" encoding="utf-8"?>
+<ds:datastoreItem xmlns:ds="http://schemas.openxmlformats.org/officeDocument/2006/customXml" ds:itemID="{3836F65B-1B07-41EE-A0E8-BC6EF3855225}">
+  <ds:schemaRefs>
+    <ds:schemaRef ds:uri="http://schemas.microsoft.com/sharepoint/v3/contenttype/forms"/>
+  </ds:schemaRefs>
+</ds:datastoreItem>
 </file>
 
-<file path=customXml/itemProps1.xml><?xml version="1.0" encoding="utf-8"?>
+<file path=customXml/itemProps2.xml><?xml version="1.0" encoding="utf-8"?>
 <ds:datastoreItem xmlns:ds="http://schemas.openxmlformats.org/officeDocument/2006/customXml" ds:itemID="{60C67BEE-D13F-4BD2-98A5-34D8A0977F68}">
   <ds:schemaRefs>
     <ds:schemaRef ds:uri="http://schemas.openxmlformats.org/package/2006/metadata/core-properties"/>
@@ -21319,7 +21087,7 @@
 </ds:datastoreItem>
 </file>
 
-<file path=customXml/itemProps2.xml><?xml version="1.0" encoding="utf-8"?>
+<file path=customXml/itemProps3.xml><?xml version="1.0" encoding="utf-8"?>
 <ds:datastoreItem xmlns:ds="http://schemas.openxmlformats.org/officeDocument/2006/customXml" ds:itemID="{A09BF4D4-EF60-4196-BFC3-9462D607978C}">
   <ds:schemaRefs>
     <ds:schemaRef ds:uri="http://schemas.microsoft.com/office/2006/metadata/contentType"/>
@@ -21335,12 +21103,4 @@
     <ds:schemaRef ds:uri="http://schemas.microsoft.com/internal/obd"/>
   </ds:schemaRefs>
 </ds:datastoreItem>
-</file>
-
-<file path=customXml/itemProps3.xml><?xml version="1.0" encoding="utf-8"?>
-<ds:datastoreItem xmlns:ds="http://schemas.openxmlformats.org/officeDocument/2006/customXml" ds:itemID="{3836F65B-1B07-41EE-A0E8-BC6EF3855225}">
-  <ds:schemaRefs>
-    <ds:schemaRef ds:uri="http://schemas.microsoft.com/sharepoint/v3/contenttype/forms"/>
-  </ds:schemaRefs>
-</ds:datastoreItem>
 </file>
</xml_diff>